<commit_message>
real and imagined navigation
</commit_message>
<xml_diff>
--- a/psilocybin_fc/siegel_etal_2024.pptx
+++ b/psilocybin_fc/siegel_etal_2024.pptx
@@ -3044,29 +3044,103 @@
           <a:bodyPr/>
           <a:lstStyle/>
           <a:p>
-            <a:pPr marL="0" marR="0" lvl="0" indent="0" algn="l" defTabSz="914400" rtl="0" eaLnBrk="1" fontAlgn="auto" latinLnBrk="0" hangingPunct="1">
-              <a:lnSpc>
-                <a:spcPct val="100000"/>
-              </a:lnSpc>
-              <a:spcBef>
-                <a:spcPts val="0"/>
-              </a:spcBef>
-              <a:spcAft>
-                <a:spcPts val="0"/>
-              </a:spcAft>
-              <a:buClrTx/>
-              <a:buSzTx/>
-              <a:buFontTx/>
-              <a:buNone/>
-              <a:tabLst/>
-              <a:defRPr/>
-            </a:pPr>
-            <a:r>
-              <a:rPr lang="en-US" dirty="0"/>
-              <a:t>After a decade of hype, psychedelic research has moved toward deeper study of neural mechanisms of the psychedelic experience and its potential benefits</a:t>
-            </a:r>
-          </a:p>
-          <a:p>
+            <a:pPr algn="l"/>
+            <a:r>
+              <a:rPr lang="en-US" sz="1800" b="0" i="0" u="none" strike="noStrike" baseline="0" dirty="0">
+                <a:latin typeface="HardingText-Regular"/>
+              </a:rPr>
+              <a:t>MDS blind to</a:t>
+            </a:r>
+          </a:p>
+          <a:p>
+            <a:pPr algn="l"/>
+            <a:r>
+              <a:rPr lang="en-US" sz="1800" b="0" i="0" u="none" strike="noStrike" baseline="0" dirty="0">
+                <a:latin typeface="HardingText-Regular"/>
+              </a:rPr>
+              <a:t>session labels was used to assess brain changes across conditions. </a:t>
+            </a:r>
+            <a:r>
+              <a:rPr lang="en-US" sz="1800" b="1" i="0" u="none" strike="noStrike" baseline="0" dirty="0">
+                <a:latin typeface="HardingText-Bold"/>
+              </a:rPr>
+              <a:t>a</a:t>
+            </a:r>
+            <a:r>
+              <a:rPr lang="en-US" sz="1800" b="0" i="0" u="none" strike="noStrike" baseline="0" dirty="0">
+                <a:latin typeface="HardingText-Regular"/>
+              </a:rPr>
+              <a:t>, In the</a:t>
+            </a:r>
+          </a:p>
+          <a:p>
+            <a:pPr algn="l"/>
+            <a:r>
+              <a:rPr lang="en-US" sz="1800" b="0" i="0" u="none" strike="noStrike" baseline="0" dirty="0">
+                <a:latin typeface="HardingText-Regular"/>
+              </a:rPr>
+              <a:t>scatter plots, each point represents whole-brain FC from a single 15 min scan,</a:t>
+            </a:r>
+          </a:p>
+          <a:p>
+            <a:pPr algn="l"/>
+            <a:r>
+              <a:rPr lang="en-US" sz="1800" b="0" i="0" u="none" strike="noStrike" baseline="0" dirty="0">
+                <a:latin typeface="HardingText-Regular"/>
+              </a:rPr>
+              <a:t>plotted in a multidimensional space on the basis of the similarity between scans.</a:t>
+            </a:r>
+          </a:p>
+          <a:p>
+            <a:pPr algn="l"/>
+            <a:r>
+              <a:rPr lang="en-US" sz="1800" b="0" i="0" u="none" strike="noStrike" baseline="0" dirty="0">
+                <a:latin typeface="HardingText-Regular"/>
+              </a:rPr>
+              <a:t>Dimensions 1 and 4 showed strong effects of psilocybin. The top shows scans</a:t>
+            </a:r>
+          </a:p>
+          <a:p>
+            <a:pPr algn="l"/>
+            <a:r>
+              <a:rPr lang="en-US" sz="1800" b="0" i="0" u="none" strike="noStrike" baseline="0" dirty="0">
+                <a:latin typeface="HardingText-Regular"/>
+              </a:rPr>
+              <a:t>coded on the basis of drug condition. Dark red denotes that the participant had</a:t>
+            </a:r>
+          </a:p>
+          <a:p>
+            <a:pPr algn="l"/>
+            <a:r>
+              <a:rPr lang="en-US" sz="1800" b="0" i="0" u="none" strike="noStrike" baseline="0" dirty="0">
+                <a:latin typeface="HardingText-Regular"/>
+              </a:rPr>
+              <a:t>an episode of emesis shortly after taking psilocybin. The bottom shows scans</a:t>
+            </a:r>
+          </a:p>
+          <a:p>
+            <a:pPr algn="l"/>
+            <a:r>
+              <a:rPr lang="en-US" sz="1800" b="0" i="0" u="none" strike="noStrike" baseline="0" dirty="0" err="1">
+                <a:latin typeface="HardingText-Regular"/>
+              </a:rPr>
+              <a:t>coloured</a:t>
+            </a:r>
+            <a:r>
+              <a:rPr lang="en-US" sz="1800" b="0" i="0" u="none" strike="noStrike" baseline="0" dirty="0">
+                <a:latin typeface="HardingText-Regular"/>
+              </a:rPr>
+              <a:t> on the basis of participant identity. Dimension 1 separates psilocybin</a:t>
+            </a:r>
+          </a:p>
+          <a:p>
+            <a:pPr algn="l"/>
+            <a:r>
+              <a:rPr lang="en-US" sz="1800" b="0" i="0" u="none" strike="noStrike" baseline="0" dirty="0">
+                <a:latin typeface="HardingText-Regular"/>
+              </a:rPr>
+              <a:t>from non-drug and MTP scans in most cases</a:t>
+            </a:r>
             <a:endParaRPr lang="en-US" dirty="0"/>
           </a:p>
         </p:txBody>
@@ -3170,15 +3244,7 @@
             </a:pPr>
             <a:r>
               <a:rPr lang="en-US" dirty="0"/>
-              <a:t>NGSC is derived from the </a:t>
-            </a:r>
-            <a:r>
-              <a:rPr lang="en-US" dirty="0" err="1"/>
-              <a:t>the</a:t>
-            </a:r>
-            <a:r>
-              <a:rPr lang="en-US" dirty="0"/>
-              <a:t> number of spatial principal components needed to explain the underlying structure. The plot to the right in fig 2a shows that under psilocybin, more principal components are needed to explain variance.</a:t>
+              <a:t>NGSC is derived from the number of spatial principal components needed to explain the underlying structure. The plot to the right in fig 2a shows that under psilocybin, more principal components are needed to explain variance.</a:t>
             </a:r>
           </a:p>
           <a:p>
@@ -7764,7 +7830,7 @@
           <a:p>
             <a:r>
               <a:rPr lang="en-US" dirty="0"/>
-              <a:t>When given an audio-visual matching task, participants showed closer-to-baseline FC.</a:t>
+              <a:t>When given an audio-visual matching task under psilocybin, participants showed closer-to-baseline FC.</a:t>
             </a:r>
           </a:p>
           <a:p>
@@ -8016,7 +8082,7 @@
           <a:p>
             <a:r>
               <a:rPr lang="en-US" dirty="0"/>
-              <a:t>Griffiths nodded toward folk-traditions of psychedelic therapy, embracing the “task” of mystic experience.</a:t>
+              <a:t>Griffiths tended toward the folk traditions of psychedelic therapy, embracing the “task” of mystic experience.</a:t>
             </a:r>
           </a:p>
           <a:p>
@@ -8074,6 +8140,47 @@
           </a:extLst>
         </p:spPr>
       </p:pic>
+      <p:sp>
+        <p:nvSpPr>
+          <p:cNvPr id="5" name="TextBox 4">
+            <a:extLst>
+              <a:ext uri="{FF2B5EF4-FFF2-40B4-BE49-F238E27FC236}">
+                <a16:creationId xmlns:a16="http://schemas.microsoft.com/office/drawing/2014/main" id="{B8E5BB16-EE90-02FA-0F05-B65BE1D355B7}"/>
+              </a:ext>
+            </a:extLst>
+          </p:cNvPr>
+          <p:cNvSpPr txBox="1"/>
+          <p:nvPr/>
+        </p:nvSpPr>
+        <p:spPr>
+          <a:xfrm>
+            <a:off x="1081094" y="6563150"/>
+            <a:ext cx="6534148" cy="276999"/>
+          </a:xfrm>
+          <a:prstGeom prst="rect">
+            <a:avLst/>
+          </a:prstGeom>
+          <a:noFill/>
+        </p:spPr>
+        <p:txBody>
+          <a:bodyPr wrap="square">
+            <a:spAutoFit/>
+          </a:bodyPr>
+          <a:lstStyle/>
+          <a:p>
+            <a:r>
+              <a:rPr lang="en-US" sz="1200" dirty="0">
+                <a:solidFill>
+                  <a:schemeClr val="bg2">
+                    <a:lumMod val="50000"/>
+                  </a:schemeClr>
+                </a:solidFill>
+              </a:rPr>
+              <a:t>https://www.nytimes.com/2024/03/21/health/psychedelics-roland-griffiths-johns-hopkins.html</a:t>
+            </a:r>
+          </a:p>
+        </p:txBody>
+      </p:sp>
     </p:spTree>
     <p:extLst>
       <p:ext uri="{BB962C8B-B14F-4D97-AF65-F5344CB8AC3E}">
@@ -8251,6 +8358,47 @@
           </a:extLst>
         </p:spPr>
       </p:pic>
+      <p:sp>
+        <p:nvSpPr>
+          <p:cNvPr id="6" name="TextBox 5">
+            <a:extLst>
+              <a:ext uri="{FF2B5EF4-FFF2-40B4-BE49-F238E27FC236}">
+                <a16:creationId xmlns:a16="http://schemas.microsoft.com/office/drawing/2014/main" id="{083F6297-3B28-A967-B5BD-C41557688EB3}"/>
+              </a:ext>
+            </a:extLst>
+          </p:cNvPr>
+          <p:cNvSpPr txBox="1"/>
+          <p:nvPr/>
+        </p:nvSpPr>
+        <p:spPr>
+          <a:xfrm>
+            <a:off x="1081094" y="6563150"/>
+            <a:ext cx="6534148" cy="276999"/>
+          </a:xfrm>
+          <a:prstGeom prst="rect">
+            <a:avLst/>
+          </a:prstGeom>
+          <a:noFill/>
+        </p:spPr>
+        <p:txBody>
+          <a:bodyPr wrap="square">
+            <a:spAutoFit/>
+          </a:bodyPr>
+          <a:lstStyle/>
+          <a:p>
+            <a:r>
+              <a:rPr lang="en-US" sz="1200" dirty="0">
+                <a:solidFill>
+                  <a:schemeClr val="bg2">
+                    <a:lumMod val="50000"/>
+                  </a:schemeClr>
+                </a:solidFill>
+              </a:rPr>
+              <a:t>https://www.nytimes.com/2024/03/21/health/psychedelics-roland-griffiths-johns-hopkins.html</a:t>
+            </a:r>
+          </a:p>
+        </p:txBody>
+      </p:sp>
     </p:spTree>
     <p:extLst>
       <p:ext uri="{BB962C8B-B14F-4D97-AF65-F5344CB8AC3E}">
@@ -8417,6 +8565,47 @@
           </a:extLst>
         </p:spPr>
       </p:pic>
+      <p:sp>
+        <p:nvSpPr>
+          <p:cNvPr id="6" name="TextBox 5">
+            <a:extLst>
+              <a:ext uri="{FF2B5EF4-FFF2-40B4-BE49-F238E27FC236}">
+                <a16:creationId xmlns:a16="http://schemas.microsoft.com/office/drawing/2014/main" id="{B4DE8676-D963-0C18-768A-B51A8C24EF25}"/>
+              </a:ext>
+            </a:extLst>
+          </p:cNvPr>
+          <p:cNvSpPr txBox="1"/>
+          <p:nvPr/>
+        </p:nvSpPr>
+        <p:spPr>
+          <a:xfrm>
+            <a:off x="1081094" y="6563150"/>
+            <a:ext cx="6534148" cy="276999"/>
+          </a:xfrm>
+          <a:prstGeom prst="rect">
+            <a:avLst/>
+          </a:prstGeom>
+          <a:noFill/>
+        </p:spPr>
+        <p:txBody>
+          <a:bodyPr wrap="square">
+            <a:spAutoFit/>
+          </a:bodyPr>
+          <a:lstStyle/>
+          <a:p>
+            <a:r>
+              <a:rPr lang="en-US" sz="1200" dirty="0">
+                <a:solidFill>
+                  <a:schemeClr val="bg2">
+                    <a:lumMod val="50000"/>
+                  </a:schemeClr>
+                </a:solidFill>
+              </a:rPr>
+              <a:t>https://www.nytimes.com/2024/03/21/health/psychedelics-roland-griffiths-johns-hopkins.html</a:t>
+            </a:r>
+          </a:p>
+        </p:txBody>
+      </p:sp>
     </p:spTree>
     <p:extLst>
       <p:ext uri="{BB962C8B-B14F-4D97-AF65-F5344CB8AC3E}">

</xml_diff>